<commit_message>
Atualizando arquivo de apresentação de slides.
</commit_message>
<xml_diff>
--- a/Slides/PI.pptx
+++ b/Slides/PI.pptx
@@ -20,25 +20,26 @@
     <p:sldId id="268" r:id="rId18"/>
     <p:sldId id="269" r:id="rId19"/>
     <p:sldId id="270" r:id="rId20"/>
+    <p:sldId id="271" r:id="rId21"/>
   </p:sldIdLst>
   <p:sldSz cx="18288000" cy="10287000"/>
   <p:notesSz cx="6858000" cy="9144000"/>
   <p:embeddedFontLst>
     <p:embeddedFont>
       <p:font typeface="Decalotype Bold" charset="1" panose="00000800000000000000"/>
-      <p:regular r:id="rId21"/>
+      <p:regular r:id="rId22"/>
     </p:embeddedFont>
     <p:embeddedFont>
       <p:font typeface="Decalotype" charset="1" panose="00000500000000000000"/>
-      <p:regular r:id="rId22"/>
+      <p:regular r:id="rId23"/>
     </p:embeddedFont>
     <p:embeddedFont>
       <p:font typeface="Decalotype Light" charset="1" panose="00000400000000000000"/>
-      <p:regular r:id="rId23"/>
+      <p:regular r:id="rId24"/>
     </p:embeddedFont>
     <p:embeddedFont>
       <p:font typeface="Open Sans" charset="1" panose="020B0606030504020204"/>
-      <p:regular r:id="rId24"/>
+      <p:regular r:id="rId25"/>
     </p:embeddedFont>
   </p:embeddedFontLst>
   <p:defaultTextStyle>
@@ -3336,60 +3337,14 @@
       </p:sp>
       <p:sp>
         <p:nvSpPr>
-          <p:cNvPr name="Freeform 4" id="4"/>
-          <p:cNvSpPr/>
-          <p:nvPr/>
-        </p:nvSpPr>
-        <p:spPr>
-          <a:xfrm flipH="false" flipV="false" rot="0">
-            <a:off x="1222489" y="5188815"/>
-            <a:ext cx="5782069" cy="2987342"/>
-          </a:xfrm>
-          <a:custGeom>
-            <a:avLst/>
-            <a:gdLst/>
-            <a:ahLst/>
-            <a:cxnLst/>
-            <a:rect r="r" b="b" t="t" l="l"/>
-            <a:pathLst>
-              <a:path h="2987342" w="5782069">
-                <a:moveTo>
-                  <a:pt x="0" y="0"/>
-                </a:moveTo>
-                <a:lnTo>
-                  <a:pt x="5782068" y="0"/>
-                </a:lnTo>
-                <a:lnTo>
-                  <a:pt x="5782068" y="2987341"/>
-                </a:lnTo>
-                <a:lnTo>
-                  <a:pt x="0" y="2987341"/>
-                </a:lnTo>
-                <a:lnTo>
-                  <a:pt x="0" y="0"/>
-                </a:lnTo>
-                <a:close/>
-              </a:path>
-            </a:pathLst>
-          </a:custGeom>
-          <a:blipFill>
-            <a:blip r:embed="rId4"/>
-            <a:stretch>
-              <a:fillRect l="-31686" t="-13263" r="-29445" b="-62165"/>
-            </a:stretch>
-          </a:blipFill>
-        </p:spPr>
-      </p:sp>
-      <p:sp>
-        <p:nvSpPr>
-          <p:cNvPr name="TextBox 5" id="5"/>
+          <p:cNvPr name="TextBox 4" id="4"/>
           <p:cNvSpPr txBox="true"/>
           <p:nvPr/>
         </p:nvSpPr>
         <p:spPr>
           <a:xfrm rot="0">
-            <a:off x="7775186" y="5164200"/>
-            <a:ext cx="9290326" cy="2950845"/>
+            <a:off x="6072066" y="2058921"/>
+            <a:ext cx="6143867" cy="1524000"/>
           </a:xfrm>
           <a:prstGeom prst="rect">
             <a:avLst/>
@@ -3401,64 +3356,125 @@
           </a:bodyPr>
           <a:lstStyle/>
           <a:p>
-            <a:pPr algn="l" marL="0" indent="0" lvl="0">
+            <a:pPr algn="ctr" marL="0" indent="0" lvl="0">
               <a:lnSpc>
-                <a:spcPts val="5880"/>
+                <a:spcPts val="11999"/>
               </a:lnSpc>
               <a:spcBef>
                 <a:spcPct val="0"/>
               </a:spcBef>
             </a:pPr>
             <a:r>
-              <a:rPr lang="en-US" sz="4200">
-                <a:solidFill>
-                  <a:srgbClr val="FFFFFF"/>
-                </a:solidFill>
-                <a:latin typeface="Decalotype Light"/>
-              </a:rPr>
-              <a:t>A logo do Agenda Fatec, foi desenvolvida inspirada nas cores utilizadas pela rede de ensino Fatec, muito semelhantes às cores utilizadas pelo Centro Paula Souza (CPS). </a:t>
-            </a:r>
-          </a:p>
-        </p:txBody>
-      </p:sp>
-      <p:sp>
-        <p:nvSpPr>
-          <p:cNvPr name="TextBox 6" id="6"/>
-          <p:cNvSpPr txBox="true"/>
-          <p:nvPr/>
-        </p:nvSpPr>
-        <p:spPr>
-          <a:xfrm rot="0">
-            <a:off x="6031661" y="2301344"/>
-            <a:ext cx="5769865" cy="1387474"/>
-          </a:xfrm>
-          <a:prstGeom prst="rect">
-            <a:avLst/>
-          </a:prstGeom>
-        </p:spPr>
-        <p:txBody>
-          <a:bodyPr anchor="t" rtlCol="false" tIns="0" lIns="0" bIns="0" rIns="0">
-            <a:spAutoFit/>
-          </a:bodyPr>
-          <a:lstStyle/>
-          <a:p>
-            <a:pPr algn="ctr">
-              <a:lnSpc>
-                <a:spcPts val="10374"/>
-              </a:lnSpc>
-            </a:pPr>
-            <a:r>
-              <a:rPr lang="en-US" sz="10374">
+              <a:rPr lang="en-US" sz="9999">
                 <a:solidFill>
                   <a:srgbClr val="FFD93B"/>
                 </a:solidFill>
                 <a:latin typeface="Decalotype Bold"/>
               </a:rPr>
-              <a:t>Logotipo</a:t>
+              <a:t>Tipografia</a:t>
             </a:r>
           </a:p>
         </p:txBody>
       </p:sp>
+      <p:grpSp>
+        <p:nvGrpSpPr>
+          <p:cNvPr name="Group 5" id="5"/>
+          <p:cNvGrpSpPr/>
+          <p:nvPr/>
+        </p:nvGrpSpPr>
+        <p:grpSpPr>
+          <a:xfrm rot="0">
+            <a:off x="5698382" y="4659425"/>
+            <a:ext cx="6891236" cy="3559129"/>
+            <a:chOff x="0" y="0"/>
+            <a:chExt cx="9188314" cy="4745505"/>
+          </a:xfrm>
+        </p:grpSpPr>
+        <p:sp>
+          <p:nvSpPr>
+            <p:cNvPr name="Freeform 6" id="6"/>
+            <p:cNvSpPr/>
+            <p:nvPr/>
+          </p:nvSpPr>
+          <p:spPr>
+            <a:xfrm flipH="false" flipV="false" rot="0">
+              <a:off x="0" y="0"/>
+              <a:ext cx="9188314" cy="3709357"/>
+            </a:xfrm>
+            <a:custGeom>
+              <a:avLst/>
+              <a:gdLst/>
+              <a:ahLst/>
+              <a:cxnLst/>
+              <a:rect r="r" b="b" t="t" l="l"/>
+              <a:pathLst>
+                <a:path h="3709357" w="9188314">
+                  <a:moveTo>
+                    <a:pt x="0" y="0"/>
+                  </a:moveTo>
+                  <a:lnTo>
+                    <a:pt x="9188314" y="0"/>
+                  </a:lnTo>
+                  <a:lnTo>
+                    <a:pt x="9188314" y="3709357"/>
+                  </a:lnTo>
+                  <a:lnTo>
+                    <a:pt x="0" y="3709357"/>
+                  </a:lnTo>
+                  <a:lnTo>
+                    <a:pt x="0" y="0"/>
+                  </a:lnTo>
+                  <a:close/>
+                </a:path>
+              </a:pathLst>
+            </a:custGeom>
+            <a:blipFill>
+              <a:blip r:embed="rId4"/>
+              <a:stretch>
+                <a:fillRect l="0" t="0" r="0" b="0"/>
+              </a:stretch>
+            </a:blipFill>
+          </p:spPr>
+        </p:sp>
+        <p:sp>
+          <p:nvSpPr>
+            <p:cNvPr name="TextBox 7" id="7"/>
+            <p:cNvSpPr txBox="true"/>
+            <p:nvPr/>
+          </p:nvSpPr>
+          <p:spPr>
+            <a:xfrm rot="0">
+              <a:off x="3236150" y="3820945"/>
+              <a:ext cx="2716014" cy="924560"/>
+            </a:xfrm>
+            <a:prstGeom prst="rect">
+              <a:avLst/>
+            </a:prstGeom>
+          </p:spPr>
+          <p:txBody>
+            <a:bodyPr anchor="t" rtlCol="false" tIns="0" lIns="0" bIns="0" rIns="0">
+              <a:spAutoFit/>
+            </a:bodyPr>
+            <a:lstStyle/>
+            <a:p>
+              <a:pPr algn="ctr">
+                <a:lnSpc>
+                  <a:spcPts val="5880"/>
+                </a:lnSpc>
+              </a:pPr>
+              <a:r>
+                <a:rPr lang="en-US" sz="4200">
+                  <a:solidFill>
+                    <a:srgbClr val="FFFFFF"/>
+                  </a:solidFill>
+                  <a:latin typeface="Open Sans"/>
+                </a:rPr>
+                <a:t>Arial MT</a:t>
+              </a:r>
+            </a:p>
+          </p:txBody>
+        </p:sp>
+      </p:grpSp>
     </p:spTree>
   </p:cSld>
   <p:clrMapOvr>
@@ -3473,7 +3489,7 @@
     <p:bg>
       <p:bgPr>
         <a:solidFill>
-          <a:srgbClr val="7B1003"/>
+          <a:srgbClr val="90362C"/>
         </a:solidFill>
       </p:bgPr>
     </p:bg>
@@ -3498,9 +3514,9 @@
           <p:nvPr/>
         </p:nvSpPr>
         <p:spPr>
-          <a:xfrm flipH="false" flipV="false" rot="0">
-            <a:off x="-2755755" y="-830853"/>
-            <a:ext cx="6289462" cy="7861827"/>
+          <a:xfrm flipH="true" flipV="false" rot="0">
+            <a:off x="-5174056" y="2508221"/>
+            <a:ext cx="12864194" cy="12864194"/>
           </a:xfrm>
           <a:custGeom>
             <a:avLst/>
@@ -3509,21 +3525,21 @@
             <a:cxnLst/>
             <a:rect r="r" b="b" t="t" l="l"/>
             <a:pathLst>
-              <a:path h="7861827" w="6289462">
+              <a:path h="12864194" w="12864194">
                 <a:moveTo>
+                  <a:pt x="12864194" y="0"/>
+                </a:moveTo>
+                <a:lnTo>
                   <a:pt x="0" y="0"/>
-                </a:moveTo>
-                <a:lnTo>
-                  <a:pt x="6289462" y="0"/>
-                </a:lnTo>
-                <a:lnTo>
-                  <a:pt x="6289462" y="7861827"/>
-                </a:lnTo>
-                <a:lnTo>
-                  <a:pt x="0" y="7861827"/>
-                </a:lnTo>
-                <a:lnTo>
-                  <a:pt x="0" y="0"/>
+                </a:lnTo>
+                <a:lnTo>
+                  <a:pt x="0" y="12864194"/>
+                </a:lnTo>
+                <a:lnTo>
+                  <a:pt x="12864194" y="12864194"/>
+                </a:lnTo>
+                <a:lnTo>
+                  <a:pt x="12864194" y="0"/>
                 </a:lnTo>
                 <a:close/>
               </a:path>
@@ -3555,9 +3571,9 @@
           <p:nvPr/>
         </p:nvSpPr>
         <p:spPr>
-          <a:xfrm flipH="false" flipV="false" rot="0">
-            <a:off x="14199263" y="1737456"/>
-            <a:ext cx="8297824" cy="10372280"/>
+          <a:xfrm flipH="true" flipV="false" rot="0">
+            <a:off x="11855903" y="-9149260"/>
+            <a:ext cx="12864194" cy="12864194"/>
           </a:xfrm>
           <a:custGeom>
             <a:avLst/>
@@ -3566,21 +3582,21 @@
             <a:cxnLst/>
             <a:rect r="r" b="b" t="t" l="l"/>
             <a:pathLst>
-              <a:path h="10372280" w="8297824">
+              <a:path h="12864194" w="12864194">
                 <a:moveTo>
+                  <a:pt x="12864194" y="0"/>
+                </a:moveTo>
+                <a:lnTo>
                   <a:pt x="0" y="0"/>
-                </a:moveTo>
-                <a:lnTo>
-                  <a:pt x="8297824" y="0"/>
-                </a:lnTo>
-                <a:lnTo>
-                  <a:pt x="8297824" y="10372280"/>
-                </a:lnTo>
-                <a:lnTo>
-                  <a:pt x="0" y="10372280"/>
-                </a:lnTo>
-                <a:lnTo>
-                  <a:pt x="0" y="0"/>
+                </a:lnTo>
+                <a:lnTo>
+                  <a:pt x="0" y="12864193"/>
+                </a:lnTo>
+                <a:lnTo>
+                  <a:pt x="12864194" y="12864193"/>
+                </a:lnTo>
+                <a:lnTo>
+                  <a:pt x="12864194" y="0"/>
                 </a:lnTo>
                 <a:close/>
               </a:path>
@@ -3613,8 +3629,8 @@
         </p:nvSpPr>
         <p:spPr>
           <a:xfrm flipH="false" flipV="false" rot="0">
-            <a:off x="11420292" y="6813286"/>
-            <a:ext cx="5557942" cy="6947427"/>
+            <a:off x="1222489" y="5188815"/>
+            <a:ext cx="5782069" cy="2987342"/>
           </a:xfrm>
           <a:custGeom>
             <a:avLst/>
@@ -3623,18 +3639,18 @@
             <a:cxnLst/>
             <a:rect r="r" b="b" t="t" l="l"/>
             <a:pathLst>
-              <a:path h="6947427" w="5557942">
+              <a:path h="2987342" w="5782069">
                 <a:moveTo>
                   <a:pt x="0" y="0"/>
                 </a:moveTo>
                 <a:lnTo>
-                  <a:pt x="5557942" y="0"/>
-                </a:lnTo>
-                <a:lnTo>
-                  <a:pt x="5557942" y="6947428"/>
-                </a:lnTo>
-                <a:lnTo>
-                  <a:pt x="0" y="6947428"/>
+                  <a:pt x="5782068" y="0"/>
+                </a:lnTo>
+                <a:lnTo>
+                  <a:pt x="5782068" y="2987341"/>
+                </a:lnTo>
+                <a:lnTo>
+                  <a:pt x="0" y="2987341"/>
                 </a:lnTo>
                 <a:lnTo>
                   <a:pt x="0" y="0"/>
@@ -3644,91 +3660,23 @@
             </a:pathLst>
           </a:custGeom>
           <a:blipFill>
-            <a:blip r:embed="rId2">
-              <a:extLst>
-                <a:ext uri="{96DAC541-7B7A-43D3-8B79-37D633B846F1}">
-                  <asvg:svgBlip xmlns:asvg="http://schemas.microsoft.com/office/drawing/2016/SVG/main" r:embed="rId3"/>
-                </a:ext>
-              </a:extLst>
-            </a:blip>
+            <a:blip r:embed="rId4"/>
             <a:stretch>
-              <a:fillRect l="0" t="0" r="0" b="0"/>
+              <a:fillRect l="-31686" t="-13263" r="-29445" b="-62165"/>
             </a:stretch>
           </a:blipFill>
-          <a:ln cap="sq">
-            <a:noFill/>
-            <a:prstDash val="solid"/>
-            <a:miter/>
-          </a:ln>
         </p:spPr>
       </p:sp>
       <p:sp>
         <p:nvSpPr>
-          <p:cNvPr name="Freeform 5" id="5"/>
-          <p:cNvSpPr/>
-          <p:nvPr/>
-        </p:nvSpPr>
-        <p:spPr>
-          <a:xfrm flipH="false" flipV="false" rot="0">
-            <a:off x="1227176" y="-7125883"/>
-            <a:ext cx="8297824" cy="10372280"/>
-          </a:xfrm>
-          <a:custGeom>
-            <a:avLst/>
-            <a:gdLst/>
-            <a:ahLst/>
-            <a:cxnLst/>
-            <a:rect r="r" b="b" t="t" l="l"/>
-            <a:pathLst>
-              <a:path h="10372280" w="8297824">
-                <a:moveTo>
-                  <a:pt x="0" y="0"/>
-                </a:moveTo>
-                <a:lnTo>
-                  <a:pt x="8297824" y="0"/>
-                </a:lnTo>
-                <a:lnTo>
-                  <a:pt x="8297824" y="10372280"/>
-                </a:lnTo>
-                <a:lnTo>
-                  <a:pt x="0" y="10372280"/>
-                </a:lnTo>
-                <a:lnTo>
-                  <a:pt x="0" y="0"/>
-                </a:lnTo>
-                <a:close/>
-              </a:path>
-            </a:pathLst>
-          </a:custGeom>
-          <a:blipFill>
-            <a:blip r:embed="rId2">
-              <a:extLst>
-                <a:ext uri="{96DAC541-7B7A-43D3-8B79-37D633B846F1}">
-                  <asvg:svgBlip xmlns:asvg="http://schemas.microsoft.com/office/drawing/2016/SVG/main" r:embed="rId3"/>
-                </a:ext>
-              </a:extLst>
-            </a:blip>
-            <a:stretch>
-              <a:fillRect l="0" t="0" r="0" b="0"/>
-            </a:stretch>
-          </a:blipFill>
-          <a:ln cap="sq">
-            <a:noFill/>
-            <a:prstDash val="solid"/>
-            <a:miter/>
-          </a:ln>
-        </p:spPr>
-      </p:sp>
-      <p:sp>
-        <p:nvSpPr>
-          <p:cNvPr name="TextBox 6" id="6"/>
+          <p:cNvPr name="TextBox 5" id="5"/>
           <p:cNvSpPr txBox="true"/>
           <p:nvPr/>
         </p:nvSpPr>
         <p:spPr>
           <a:xfrm rot="0">
-            <a:off x="5824945" y="1968027"/>
-            <a:ext cx="6638111" cy="3038475"/>
+            <a:off x="7775186" y="5164200"/>
+            <a:ext cx="9290326" cy="2950845"/>
           </a:xfrm>
           <a:prstGeom prst="rect">
             <a:avLst/>
@@ -3740,52 +3688,36 @@
           </a:bodyPr>
           <a:lstStyle/>
           <a:p>
-            <a:pPr algn="ctr">
+            <a:pPr algn="l" marL="0" indent="0" lvl="0">
               <a:lnSpc>
-                <a:spcPts val="11999"/>
-              </a:lnSpc>
-            </a:pPr>
-            <a:r>
-              <a:rPr lang="en-US" sz="9999">
-                <a:solidFill>
-                  <a:srgbClr val="FFD93B"/>
-                </a:solidFill>
-                <a:latin typeface="Decalotype Bold"/>
-              </a:rPr>
-              <a:t>Protótipo</a:t>
-            </a:r>
-          </a:p>
-          <a:p>
-            <a:pPr algn="ctr" marL="0" indent="0" lvl="0">
-              <a:lnSpc>
-                <a:spcPts val="11999"/>
+                <a:spcPts val="5880"/>
               </a:lnSpc>
               <a:spcBef>
                 <a:spcPct val="0"/>
               </a:spcBef>
             </a:pPr>
             <a:r>
-              <a:rPr lang="en-US" sz="9999">
+              <a:rPr lang="en-US" sz="4200">
                 <a:solidFill>
-                  <a:srgbClr val="FFD93B"/>
+                  <a:srgbClr val="FFFFFF"/>
                 </a:solidFill>
-                <a:latin typeface="Decalotype Bold"/>
+                <a:latin typeface="Decalotype Light"/>
               </a:rPr>
-              <a:t>do Projeto</a:t>
+              <a:t>A logo do Agenda Fatec, foi desenvolvida inspirada nas cores utilizadas pela rede de ensino Fatec, muito semelhantes às cores utilizadas pelo Centro Paula Souza (CPS). </a:t>
             </a:r>
           </a:p>
         </p:txBody>
       </p:sp>
       <p:sp>
         <p:nvSpPr>
-          <p:cNvPr name="TextBox 7" id="7"/>
+          <p:cNvPr name="TextBox 6" id="6"/>
           <p:cNvSpPr txBox="true"/>
           <p:nvPr/>
         </p:nvSpPr>
         <p:spPr>
           <a:xfrm rot="0">
-            <a:off x="4152900" y="6101553"/>
-            <a:ext cx="9982200" cy="2207895"/>
+            <a:off x="6031661" y="2301344"/>
+            <a:ext cx="5769865" cy="1387474"/>
           </a:xfrm>
           <a:prstGeom prst="rect">
             <a:avLst/>
@@ -3799,18 +3731,17 @@
           <a:p>
             <a:pPr algn="ctr">
               <a:lnSpc>
-                <a:spcPts val="5880"/>
+                <a:spcPts val="10374"/>
               </a:lnSpc>
             </a:pPr>
             <a:r>
-              <a:rPr lang="en-US" sz="4200" u="sng">
+              <a:rPr lang="en-US" sz="10374">
                 <a:solidFill>
-                  <a:srgbClr val="FFFFFF"/>
+                  <a:srgbClr val="FFD93B"/>
                 </a:solidFill>
-                <a:latin typeface="Decalotype Light"/>
-                <a:hlinkClick r:id="rId4" tooltip="https://www.figma.com/design/0YOvLh2Zu1DpA57Q6KdQkl/Projeto-Integrador?node-id=1%3A3&amp;t=CIlk9aMN2xa8h7mD-1"/>
+                <a:latin typeface="Decalotype Bold"/>
               </a:rPr>
-              <a:t>https://www.figma.com/design/0YOvLh2Zu1DpA57Q6KdQkl/Projeto-Integrador?node-id=1%3A3&amp;t=CIlk9aMN2xa8h7mD-1</a:t>
+              <a:t>Logotipo</a:t>
             </a:r>
           </a:p>
         </p:txBody>
@@ -4083,6 +4014,362 @@
         </p:nvSpPr>
         <p:spPr>
           <a:xfrm rot="0">
+            <a:off x="5824945" y="1968027"/>
+            <a:ext cx="6638111" cy="3038475"/>
+          </a:xfrm>
+          <a:prstGeom prst="rect">
+            <a:avLst/>
+          </a:prstGeom>
+        </p:spPr>
+        <p:txBody>
+          <a:bodyPr anchor="t" rtlCol="false" tIns="0" lIns="0" bIns="0" rIns="0">
+            <a:spAutoFit/>
+          </a:bodyPr>
+          <a:lstStyle/>
+          <a:p>
+            <a:pPr algn="ctr">
+              <a:lnSpc>
+                <a:spcPts val="11999"/>
+              </a:lnSpc>
+            </a:pPr>
+            <a:r>
+              <a:rPr lang="en-US" sz="9999">
+                <a:solidFill>
+                  <a:srgbClr val="FFD93B"/>
+                </a:solidFill>
+                <a:latin typeface="Decalotype Bold"/>
+              </a:rPr>
+              <a:t>Protótipo</a:t>
+            </a:r>
+          </a:p>
+          <a:p>
+            <a:pPr algn="ctr" marL="0" indent="0" lvl="0">
+              <a:lnSpc>
+                <a:spcPts val="11999"/>
+              </a:lnSpc>
+              <a:spcBef>
+                <a:spcPct val="0"/>
+              </a:spcBef>
+            </a:pPr>
+            <a:r>
+              <a:rPr lang="en-US" sz="9999">
+                <a:solidFill>
+                  <a:srgbClr val="FFD93B"/>
+                </a:solidFill>
+                <a:latin typeface="Decalotype Bold"/>
+              </a:rPr>
+              <a:t>do Projeto</a:t>
+            </a:r>
+          </a:p>
+        </p:txBody>
+      </p:sp>
+      <p:sp>
+        <p:nvSpPr>
+          <p:cNvPr name="TextBox 7" id="7"/>
+          <p:cNvSpPr txBox="true"/>
+          <p:nvPr/>
+        </p:nvSpPr>
+        <p:spPr>
+          <a:xfrm rot="0">
+            <a:off x="4152900" y="6101553"/>
+            <a:ext cx="9982200" cy="2207895"/>
+          </a:xfrm>
+          <a:prstGeom prst="rect">
+            <a:avLst/>
+          </a:prstGeom>
+        </p:spPr>
+        <p:txBody>
+          <a:bodyPr anchor="t" rtlCol="false" tIns="0" lIns="0" bIns="0" rIns="0">
+            <a:spAutoFit/>
+          </a:bodyPr>
+          <a:lstStyle/>
+          <a:p>
+            <a:pPr algn="ctr">
+              <a:lnSpc>
+                <a:spcPts val="5880"/>
+              </a:lnSpc>
+            </a:pPr>
+            <a:r>
+              <a:rPr lang="en-US" sz="4200" u="sng">
+                <a:solidFill>
+                  <a:srgbClr val="FFFFFF"/>
+                </a:solidFill>
+                <a:latin typeface="Decalotype Light"/>
+                <a:hlinkClick r:id="rId4" tooltip="https://www.figma.com/design/0YOvLh2Zu1DpA57Q6KdQkl/Projeto-Integrador?node-id=1%3A3&amp;t=CIlk9aMN2xa8h7mD-1"/>
+              </a:rPr>
+              <a:t>https://www.figma.com/design/0YOvLh2Zu1DpA57Q6KdQkl/Projeto-Integrador?node-id=1%3A3&amp;t=CIlk9aMN2xa8h7mD-1</a:t>
+            </a:r>
+          </a:p>
+        </p:txBody>
+      </p:sp>
+    </p:spTree>
+  </p:cSld>
+  <p:clrMapOvr>
+    <a:masterClrMapping/>
+  </p:clrMapOvr>
+</p:sld>
+</file>
+
+<file path=ppt/slides/slide13.xml><?xml version="1.0" encoding="utf-8"?>
+<p:sld xmlns:p="http://schemas.openxmlformats.org/presentationml/2006/main" xmlns:a="http://schemas.openxmlformats.org/drawingml/2006/main" xmlns:r="http://schemas.openxmlformats.org/officeDocument/2006/relationships">
+  <p:cSld>
+    <p:bg>
+      <p:bgPr>
+        <a:solidFill>
+          <a:srgbClr val="7B1003"/>
+        </a:solidFill>
+      </p:bgPr>
+    </p:bg>
+    <p:spTree>
+      <p:nvGrpSpPr>
+        <p:cNvPr id="1" name=""/>
+        <p:cNvGrpSpPr/>
+        <p:nvPr/>
+      </p:nvGrpSpPr>
+      <p:grpSpPr>
+        <a:xfrm>
+          <a:off x="0" y="0"/>
+          <a:ext cx="0" cy="0"/>
+          <a:chOff x="0" y="0"/>
+          <a:chExt cx="0" cy="0"/>
+        </a:xfrm>
+      </p:grpSpPr>
+      <p:sp>
+        <p:nvSpPr>
+          <p:cNvPr name="Freeform 2" id="2"/>
+          <p:cNvSpPr/>
+          <p:nvPr/>
+        </p:nvSpPr>
+        <p:spPr>
+          <a:xfrm flipH="false" flipV="false" rot="0">
+            <a:off x="-2755755" y="-830853"/>
+            <a:ext cx="6289462" cy="7861827"/>
+          </a:xfrm>
+          <a:custGeom>
+            <a:avLst/>
+            <a:gdLst/>
+            <a:ahLst/>
+            <a:cxnLst/>
+            <a:rect r="r" b="b" t="t" l="l"/>
+            <a:pathLst>
+              <a:path h="7861827" w="6289462">
+                <a:moveTo>
+                  <a:pt x="0" y="0"/>
+                </a:moveTo>
+                <a:lnTo>
+                  <a:pt x="6289462" y="0"/>
+                </a:lnTo>
+                <a:lnTo>
+                  <a:pt x="6289462" y="7861827"/>
+                </a:lnTo>
+                <a:lnTo>
+                  <a:pt x="0" y="7861827"/>
+                </a:lnTo>
+                <a:lnTo>
+                  <a:pt x="0" y="0"/>
+                </a:lnTo>
+                <a:close/>
+              </a:path>
+            </a:pathLst>
+          </a:custGeom>
+          <a:blipFill>
+            <a:blip r:embed="rId2">
+              <a:extLst>
+                <a:ext uri="{96DAC541-7B7A-43D3-8B79-37D633B846F1}">
+                  <asvg:svgBlip xmlns:asvg="http://schemas.microsoft.com/office/drawing/2016/SVG/main" r:embed="rId3"/>
+                </a:ext>
+              </a:extLst>
+            </a:blip>
+            <a:stretch>
+              <a:fillRect l="0" t="0" r="0" b="0"/>
+            </a:stretch>
+          </a:blipFill>
+          <a:ln cap="sq">
+            <a:noFill/>
+            <a:prstDash val="solid"/>
+            <a:miter/>
+          </a:ln>
+        </p:spPr>
+      </p:sp>
+      <p:sp>
+        <p:nvSpPr>
+          <p:cNvPr name="Freeform 3" id="3"/>
+          <p:cNvSpPr/>
+          <p:nvPr/>
+        </p:nvSpPr>
+        <p:spPr>
+          <a:xfrm flipH="false" flipV="false" rot="0">
+            <a:off x="14199263" y="1737456"/>
+            <a:ext cx="8297824" cy="10372280"/>
+          </a:xfrm>
+          <a:custGeom>
+            <a:avLst/>
+            <a:gdLst/>
+            <a:ahLst/>
+            <a:cxnLst/>
+            <a:rect r="r" b="b" t="t" l="l"/>
+            <a:pathLst>
+              <a:path h="10372280" w="8297824">
+                <a:moveTo>
+                  <a:pt x="0" y="0"/>
+                </a:moveTo>
+                <a:lnTo>
+                  <a:pt x="8297824" y="0"/>
+                </a:lnTo>
+                <a:lnTo>
+                  <a:pt x="8297824" y="10372280"/>
+                </a:lnTo>
+                <a:lnTo>
+                  <a:pt x="0" y="10372280"/>
+                </a:lnTo>
+                <a:lnTo>
+                  <a:pt x="0" y="0"/>
+                </a:lnTo>
+                <a:close/>
+              </a:path>
+            </a:pathLst>
+          </a:custGeom>
+          <a:blipFill>
+            <a:blip r:embed="rId2">
+              <a:extLst>
+                <a:ext uri="{96DAC541-7B7A-43D3-8B79-37D633B846F1}">
+                  <asvg:svgBlip xmlns:asvg="http://schemas.microsoft.com/office/drawing/2016/SVG/main" r:embed="rId3"/>
+                </a:ext>
+              </a:extLst>
+            </a:blip>
+            <a:stretch>
+              <a:fillRect l="0" t="0" r="0" b="0"/>
+            </a:stretch>
+          </a:blipFill>
+          <a:ln cap="sq">
+            <a:noFill/>
+            <a:prstDash val="solid"/>
+            <a:miter/>
+          </a:ln>
+        </p:spPr>
+      </p:sp>
+      <p:sp>
+        <p:nvSpPr>
+          <p:cNvPr name="Freeform 4" id="4"/>
+          <p:cNvSpPr/>
+          <p:nvPr/>
+        </p:nvSpPr>
+        <p:spPr>
+          <a:xfrm flipH="false" flipV="false" rot="0">
+            <a:off x="11420292" y="6813286"/>
+            <a:ext cx="5557942" cy="6947427"/>
+          </a:xfrm>
+          <a:custGeom>
+            <a:avLst/>
+            <a:gdLst/>
+            <a:ahLst/>
+            <a:cxnLst/>
+            <a:rect r="r" b="b" t="t" l="l"/>
+            <a:pathLst>
+              <a:path h="6947427" w="5557942">
+                <a:moveTo>
+                  <a:pt x="0" y="0"/>
+                </a:moveTo>
+                <a:lnTo>
+                  <a:pt x="5557942" y="0"/>
+                </a:lnTo>
+                <a:lnTo>
+                  <a:pt x="5557942" y="6947428"/>
+                </a:lnTo>
+                <a:lnTo>
+                  <a:pt x="0" y="6947428"/>
+                </a:lnTo>
+                <a:lnTo>
+                  <a:pt x="0" y="0"/>
+                </a:lnTo>
+                <a:close/>
+              </a:path>
+            </a:pathLst>
+          </a:custGeom>
+          <a:blipFill>
+            <a:blip r:embed="rId2">
+              <a:extLst>
+                <a:ext uri="{96DAC541-7B7A-43D3-8B79-37D633B846F1}">
+                  <asvg:svgBlip xmlns:asvg="http://schemas.microsoft.com/office/drawing/2016/SVG/main" r:embed="rId3"/>
+                </a:ext>
+              </a:extLst>
+            </a:blip>
+            <a:stretch>
+              <a:fillRect l="0" t="0" r="0" b="0"/>
+            </a:stretch>
+          </a:blipFill>
+          <a:ln cap="sq">
+            <a:noFill/>
+            <a:prstDash val="solid"/>
+            <a:miter/>
+          </a:ln>
+        </p:spPr>
+      </p:sp>
+      <p:sp>
+        <p:nvSpPr>
+          <p:cNvPr name="Freeform 5" id="5"/>
+          <p:cNvSpPr/>
+          <p:nvPr/>
+        </p:nvSpPr>
+        <p:spPr>
+          <a:xfrm flipH="false" flipV="false" rot="0">
+            <a:off x="1227176" y="-7125883"/>
+            <a:ext cx="8297824" cy="10372280"/>
+          </a:xfrm>
+          <a:custGeom>
+            <a:avLst/>
+            <a:gdLst/>
+            <a:ahLst/>
+            <a:cxnLst/>
+            <a:rect r="r" b="b" t="t" l="l"/>
+            <a:pathLst>
+              <a:path h="10372280" w="8297824">
+                <a:moveTo>
+                  <a:pt x="0" y="0"/>
+                </a:moveTo>
+                <a:lnTo>
+                  <a:pt x="8297824" y="0"/>
+                </a:lnTo>
+                <a:lnTo>
+                  <a:pt x="8297824" y="10372280"/>
+                </a:lnTo>
+                <a:lnTo>
+                  <a:pt x="0" y="10372280"/>
+                </a:lnTo>
+                <a:lnTo>
+                  <a:pt x="0" y="0"/>
+                </a:lnTo>
+                <a:close/>
+              </a:path>
+            </a:pathLst>
+          </a:custGeom>
+          <a:blipFill>
+            <a:blip r:embed="rId2">
+              <a:extLst>
+                <a:ext uri="{96DAC541-7B7A-43D3-8B79-37D633B846F1}">
+                  <asvg:svgBlip xmlns:asvg="http://schemas.microsoft.com/office/drawing/2016/SVG/main" r:embed="rId3"/>
+                </a:ext>
+              </a:extLst>
+            </a:blip>
+            <a:stretch>
+              <a:fillRect l="0" t="0" r="0" b="0"/>
+            </a:stretch>
+          </a:blipFill>
+          <a:ln cap="sq">
+            <a:noFill/>
+            <a:prstDash val="solid"/>
+            <a:miter/>
+          </a:ln>
+        </p:spPr>
+      </p:sp>
+      <p:sp>
+        <p:nvSpPr>
+          <p:cNvPr name="TextBox 6" id="6"/>
+          <p:cNvSpPr txBox="true"/>
+          <p:nvPr/>
+        </p:nvSpPr>
+        <p:spPr>
+          <a:xfrm rot="0">
             <a:off x="4870856" y="2834943"/>
             <a:ext cx="8546289" cy="1524000"/>
           </a:xfrm>
@@ -4163,7 +4450,7 @@
 </p:sld>
 </file>
 
-<file path=ppt/slides/slide13.xml><?xml version="1.0" encoding="utf-8"?>
+<file path=ppt/slides/slide14.xml><?xml version="1.0" encoding="utf-8"?>
 <p:sld xmlns:p="http://schemas.openxmlformats.org/presentationml/2006/main" xmlns:a="http://schemas.openxmlformats.org/drawingml/2006/main" xmlns:r="http://schemas.openxmlformats.org/officeDocument/2006/relationships">
   <p:cSld>
     <p:bg>
@@ -4506,7 +4793,7 @@
 </p:sld>
 </file>
 
-<file path=ppt/slides/slide14.xml><?xml version="1.0" encoding="utf-8"?>
+<file path=ppt/slides/slide15.xml><?xml version="1.0" encoding="utf-8"?>
 <p:sld xmlns:p="http://schemas.openxmlformats.org/presentationml/2006/main" xmlns:a="http://schemas.openxmlformats.org/drawingml/2006/main" xmlns:r="http://schemas.openxmlformats.org/officeDocument/2006/relationships">
   <p:cSld>
     <p:bg>
@@ -5005,7 +5292,7 @@
 </p:sld>
 </file>
 
-<file path=ppt/slides/slide15.xml><?xml version="1.0" encoding="utf-8"?>
+<file path=ppt/slides/slide16.xml><?xml version="1.0" encoding="utf-8"?>
 <p:sld xmlns:p="http://schemas.openxmlformats.org/presentationml/2006/main" xmlns:a="http://schemas.openxmlformats.org/drawingml/2006/main" xmlns:r="http://schemas.openxmlformats.org/officeDocument/2006/relationships">
   <p:cSld>
     <p:bg>
@@ -5089,7 +5376,7 @@
         </p:nvSpPr>
         <p:spPr>
           <a:xfrm rot="0">
-            <a:off x="5846779" y="3294268"/>
+            <a:off x="5846779" y="3310649"/>
             <a:ext cx="6594443" cy="1524000"/>
           </a:xfrm>
           <a:prstGeom prst="rect">
@@ -5139,7 +5426,7 @@
         </p:nvSpPr>
         <p:spPr>
           <a:xfrm rot="0">
-            <a:off x="5106162" y="5617322"/>
+            <a:off x="5106162" y="5600941"/>
             <a:ext cx="8075677" cy="1365885"/>
           </a:xfrm>
           <a:prstGeom prst="rect">
@@ -6856,7 +7143,7 @@
                 </a:solidFill>
                 <a:latin typeface="Decalotype Bold"/>
               </a:rPr>
-              <a:t>Requisitos não Funcionais</a:t>
+              <a:t>Requisitos Não Funcionais</a:t>
             </a:r>
           </a:p>
         </p:txBody>
@@ -7029,6 +7316,313 @@
 </file>
 
 <file path=ppt/slides/slide7.xml><?xml version="1.0" encoding="utf-8"?>
+<p:sld xmlns:p="http://schemas.openxmlformats.org/presentationml/2006/main" xmlns:a="http://schemas.openxmlformats.org/drawingml/2006/main">
+  <p:cSld>
+    <p:bg>
+      <p:bgPr>
+        <a:solidFill>
+          <a:srgbClr val="90362C"/>
+        </a:solidFill>
+      </p:bgPr>
+    </p:bg>
+    <p:spTree>
+      <p:nvGrpSpPr>
+        <p:cNvPr id="1" name=""/>
+        <p:cNvGrpSpPr/>
+        <p:nvPr/>
+      </p:nvGrpSpPr>
+      <p:grpSpPr>
+        <a:xfrm>
+          <a:off x="0" y="0"/>
+          <a:ext cx="0" cy="0"/>
+          <a:chOff x="0" y="0"/>
+          <a:chExt cx="0" cy="0"/>
+        </a:xfrm>
+      </p:grpSpPr>
+      <p:sp>
+        <p:nvSpPr>
+          <p:cNvPr name="TextBox 2" id="2"/>
+          <p:cNvSpPr txBox="true"/>
+          <p:nvPr/>
+        </p:nvSpPr>
+        <p:spPr>
+          <a:xfrm rot="0">
+            <a:off x="1533490" y="2596914"/>
+            <a:ext cx="15221020" cy="1524000"/>
+          </a:xfrm>
+          <a:prstGeom prst="rect">
+            <a:avLst/>
+          </a:prstGeom>
+        </p:spPr>
+        <p:txBody>
+          <a:bodyPr anchor="t" rtlCol="false" tIns="0" lIns="0" bIns="0" rIns="0">
+            <a:spAutoFit/>
+          </a:bodyPr>
+          <a:lstStyle/>
+          <a:p>
+            <a:pPr algn="ctr" marL="0" indent="0" lvl="0">
+              <a:lnSpc>
+                <a:spcPts val="11999"/>
+              </a:lnSpc>
+              <a:spcBef>
+                <a:spcPct val="0"/>
+              </a:spcBef>
+            </a:pPr>
+            <a:r>
+              <a:rPr lang="en-US" sz="9999">
+                <a:solidFill>
+                  <a:srgbClr val="FFD93B"/>
+                </a:solidFill>
+                <a:latin typeface="Decalotype Bold"/>
+              </a:rPr>
+              <a:t>Público Alvo</a:t>
+            </a:r>
+          </a:p>
+        </p:txBody>
+      </p:sp>
+      <p:grpSp>
+        <p:nvGrpSpPr>
+          <p:cNvPr name="Group 3" id="3"/>
+          <p:cNvGrpSpPr/>
+          <p:nvPr/>
+        </p:nvGrpSpPr>
+        <p:grpSpPr>
+          <a:xfrm rot="0">
+            <a:off x="3116953" y="5558391"/>
+            <a:ext cx="5654470" cy="2122170"/>
+            <a:chOff x="0" y="0"/>
+            <a:chExt cx="7539294" cy="2829560"/>
+          </a:xfrm>
+        </p:grpSpPr>
+        <p:sp>
+          <p:nvSpPr>
+            <p:cNvPr name="TextBox 4" id="4"/>
+            <p:cNvSpPr txBox="true"/>
+            <p:nvPr/>
+          </p:nvSpPr>
+          <p:spPr>
+            <a:xfrm rot="0">
+              <a:off x="739306" y="-85725"/>
+              <a:ext cx="6799988" cy="2915285"/>
+            </a:xfrm>
+            <a:prstGeom prst="rect">
+              <a:avLst/>
+            </a:prstGeom>
+          </p:spPr>
+          <p:txBody>
+            <a:bodyPr anchor="t" rtlCol="false" tIns="0" lIns="0" bIns="0" rIns="0">
+              <a:spAutoFit/>
+            </a:bodyPr>
+            <a:lstStyle/>
+            <a:p>
+              <a:pPr algn="l">
+                <a:lnSpc>
+                  <a:spcPts val="5880"/>
+                </a:lnSpc>
+              </a:pPr>
+              <a:r>
+                <a:rPr lang="en-US" sz="4200">
+                  <a:solidFill>
+                    <a:srgbClr val="FFFFFF"/>
+                  </a:solidFill>
+                  <a:latin typeface="Decalotype"/>
+                </a:rPr>
+                <a:t>Alunos;</a:t>
+              </a:r>
+            </a:p>
+            <a:p>
+              <a:pPr algn="l">
+                <a:lnSpc>
+                  <a:spcPts val="5880"/>
+                </a:lnSpc>
+              </a:pPr>
+            </a:p>
+            <a:p>
+              <a:pPr algn="l" marL="0" indent="0" lvl="0">
+                <a:lnSpc>
+                  <a:spcPts val="5880"/>
+                </a:lnSpc>
+                <a:spcBef>
+                  <a:spcPct val="0"/>
+                </a:spcBef>
+              </a:pPr>
+              <a:r>
+                <a:rPr lang="en-US" sz="4200">
+                  <a:solidFill>
+                    <a:srgbClr val="FFFFFF"/>
+                  </a:solidFill>
+                  <a:latin typeface="Decalotype"/>
+                </a:rPr>
+                <a:t>Auxiliares de docente;</a:t>
+              </a:r>
+            </a:p>
+          </p:txBody>
+        </p:sp>
+        <p:sp>
+          <p:nvSpPr>
+            <p:cNvPr name="AutoShape 5" id="5"/>
+            <p:cNvSpPr/>
+            <p:nvPr/>
+          </p:nvSpPr>
+          <p:spPr>
+            <a:xfrm rot="0">
+              <a:off x="0" y="292995"/>
+              <a:ext cx="351255" cy="361665"/>
+            </a:xfrm>
+            <a:prstGeom prst="rect">
+              <a:avLst/>
+            </a:prstGeom>
+            <a:solidFill>
+              <a:srgbClr val="FFD93B"/>
+            </a:solidFill>
+          </p:spPr>
+        </p:sp>
+        <p:sp>
+          <p:nvSpPr>
+            <p:cNvPr name="AutoShape 6" id="6"/>
+            <p:cNvSpPr/>
+            <p:nvPr/>
+          </p:nvSpPr>
+          <p:spPr>
+            <a:xfrm rot="0">
+              <a:off x="0" y="2262540"/>
+              <a:ext cx="351255" cy="361665"/>
+            </a:xfrm>
+            <a:prstGeom prst="rect">
+              <a:avLst/>
+            </a:prstGeom>
+            <a:solidFill>
+              <a:srgbClr val="FFD93B"/>
+            </a:solidFill>
+          </p:spPr>
+        </p:sp>
+      </p:grpSp>
+      <p:grpSp>
+        <p:nvGrpSpPr>
+          <p:cNvPr name="Group 7" id="7"/>
+          <p:cNvGrpSpPr/>
+          <p:nvPr/>
+        </p:nvGrpSpPr>
+        <p:grpSpPr>
+          <a:xfrm rot="0">
+            <a:off x="10732883" y="5558391"/>
+            <a:ext cx="4438164" cy="2122170"/>
+            <a:chOff x="0" y="0"/>
+            <a:chExt cx="5917552" cy="2829560"/>
+          </a:xfrm>
+        </p:grpSpPr>
+        <p:sp>
+          <p:nvSpPr>
+            <p:cNvPr name="TextBox 8" id="8"/>
+            <p:cNvSpPr txBox="true"/>
+            <p:nvPr/>
+          </p:nvSpPr>
+          <p:spPr>
+            <a:xfrm rot="0">
+              <a:off x="809156" y="-85725"/>
+              <a:ext cx="5108396" cy="2915285"/>
+            </a:xfrm>
+            <a:prstGeom prst="rect">
+              <a:avLst/>
+            </a:prstGeom>
+          </p:spPr>
+          <p:txBody>
+            <a:bodyPr anchor="t" rtlCol="false" tIns="0" lIns="0" bIns="0" rIns="0">
+              <a:spAutoFit/>
+            </a:bodyPr>
+            <a:lstStyle/>
+            <a:p>
+              <a:pPr algn="l">
+                <a:lnSpc>
+                  <a:spcPts val="5880"/>
+                </a:lnSpc>
+              </a:pPr>
+              <a:r>
+                <a:rPr lang="en-US" sz="4200">
+                  <a:solidFill>
+                    <a:srgbClr val="FFFFFF"/>
+                  </a:solidFill>
+                  <a:latin typeface="Decalotype"/>
+                </a:rPr>
+                <a:t>Coordenadores;</a:t>
+              </a:r>
+            </a:p>
+            <a:p>
+              <a:pPr algn="l">
+                <a:lnSpc>
+                  <a:spcPts val="5880"/>
+                </a:lnSpc>
+              </a:pPr>
+            </a:p>
+            <a:p>
+              <a:pPr algn="l" marL="0" indent="0" lvl="0">
+                <a:lnSpc>
+                  <a:spcPts val="5880"/>
+                </a:lnSpc>
+                <a:spcBef>
+                  <a:spcPct val="0"/>
+                </a:spcBef>
+              </a:pPr>
+              <a:r>
+                <a:rPr lang="en-US" sz="4200">
+                  <a:solidFill>
+                    <a:srgbClr val="FFFFFF"/>
+                  </a:solidFill>
+                  <a:latin typeface="Decalotype"/>
+                </a:rPr>
+                <a:t>Professores.</a:t>
+              </a:r>
+            </a:p>
+          </p:txBody>
+        </p:sp>
+        <p:sp>
+          <p:nvSpPr>
+            <p:cNvPr name="AutoShape 9" id="9"/>
+            <p:cNvSpPr/>
+            <p:nvPr/>
+          </p:nvSpPr>
+          <p:spPr>
+            <a:xfrm rot="0">
+              <a:off x="0" y="292995"/>
+              <a:ext cx="384441" cy="361665"/>
+            </a:xfrm>
+            <a:prstGeom prst="rect">
+              <a:avLst/>
+            </a:prstGeom>
+            <a:solidFill>
+              <a:srgbClr val="FFD93B"/>
+            </a:solidFill>
+          </p:spPr>
+        </p:sp>
+        <p:sp>
+          <p:nvSpPr>
+            <p:cNvPr name="AutoShape 10" id="10"/>
+            <p:cNvSpPr/>
+            <p:nvPr/>
+          </p:nvSpPr>
+          <p:spPr>
+            <a:xfrm rot="0">
+              <a:off x="0" y="2262540"/>
+              <a:ext cx="384441" cy="361665"/>
+            </a:xfrm>
+            <a:prstGeom prst="rect">
+              <a:avLst/>
+            </a:prstGeom>
+            <a:solidFill>
+              <a:srgbClr val="FFD93B"/>
+            </a:solidFill>
+          </p:spPr>
+        </p:sp>
+      </p:grpSp>
+    </p:spTree>
+  </p:cSld>
+  <p:clrMapOvr>
+    <a:masterClrMapping/>
+  </p:clrMapOvr>
+</p:sld>
+</file>
+
+<file path=ppt/slides/slide8.xml><?xml version="1.0" encoding="utf-8"?>
 <p:sld xmlns:p="http://schemas.openxmlformats.org/presentationml/2006/main" xmlns:a="http://schemas.openxmlformats.org/drawingml/2006/main" xmlns:r="http://schemas.openxmlformats.org/officeDocument/2006/relationships">
   <p:cSld>
     <p:bg>
@@ -7147,7 +7741,7 @@
 </p:sld>
 </file>
 
-<file path=ppt/slides/slide8.xml><?xml version="1.0" encoding="utf-8"?>
+<file path=ppt/slides/slide9.xml><?xml version="1.0" encoding="utf-8"?>
 <p:sld xmlns:p="http://schemas.openxmlformats.org/presentationml/2006/main" xmlns:a="http://schemas.openxmlformats.org/drawingml/2006/main" xmlns:r="http://schemas.openxmlformats.org/officeDocument/2006/relationships">
   <p:cSld>
     <p:bg>
@@ -8018,292 +8612,6 @@
 </p:sld>
 </file>
 
-<file path=ppt/slides/slide9.xml><?xml version="1.0" encoding="utf-8"?>
-<p:sld xmlns:p="http://schemas.openxmlformats.org/presentationml/2006/main" xmlns:a="http://schemas.openxmlformats.org/drawingml/2006/main" xmlns:r="http://schemas.openxmlformats.org/officeDocument/2006/relationships">
-  <p:cSld>
-    <p:bg>
-      <p:bgPr>
-        <a:solidFill>
-          <a:srgbClr val="90362C"/>
-        </a:solidFill>
-      </p:bgPr>
-    </p:bg>
-    <p:spTree>
-      <p:nvGrpSpPr>
-        <p:cNvPr id="1" name=""/>
-        <p:cNvGrpSpPr/>
-        <p:nvPr/>
-      </p:nvGrpSpPr>
-      <p:grpSpPr>
-        <a:xfrm>
-          <a:off x="0" y="0"/>
-          <a:ext cx="0" cy="0"/>
-          <a:chOff x="0" y="0"/>
-          <a:chExt cx="0" cy="0"/>
-        </a:xfrm>
-      </p:grpSpPr>
-      <p:sp>
-        <p:nvSpPr>
-          <p:cNvPr name="Freeform 2" id="2"/>
-          <p:cNvSpPr/>
-          <p:nvPr/>
-        </p:nvSpPr>
-        <p:spPr>
-          <a:xfrm flipH="true" flipV="false" rot="0">
-            <a:off x="-5174056" y="2508221"/>
-            <a:ext cx="12864194" cy="12864194"/>
-          </a:xfrm>
-          <a:custGeom>
-            <a:avLst/>
-            <a:gdLst/>
-            <a:ahLst/>
-            <a:cxnLst/>
-            <a:rect r="r" b="b" t="t" l="l"/>
-            <a:pathLst>
-              <a:path h="12864194" w="12864194">
-                <a:moveTo>
-                  <a:pt x="12864194" y="0"/>
-                </a:moveTo>
-                <a:lnTo>
-                  <a:pt x="0" y="0"/>
-                </a:lnTo>
-                <a:lnTo>
-                  <a:pt x="0" y="12864194"/>
-                </a:lnTo>
-                <a:lnTo>
-                  <a:pt x="12864194" y="12864194"/>
-                </a:lnTo>
-                <a:lnTo>
-                  <a:pt x="12864194" y="0"/>
-                </a:lnTo>
-                <a:close/>
-              </a:path>
-            </a:pathLst>
-          </a:custGeom>
-          <a:blipFill>
-            <a:blip r:embed="rId2">
-              <a:extLst>
-                <a:ext uri="{96DAC541-7B7A-43D3-8B79-37D633B846F1}">
-                  <asvg:svgBlip xmlns:asvg="http://schemas.microsoft.com/office/drawing/2016/SVG/main" r:embed="rId3"/>
-                </a:ext>
-              </a:extLst>
-            </a:blip>
-            <a:stretch>
-              <a:fillRect l="0" t="0" r="0" b="0"/>
-            </a:stretch>
-          </a:blipFill>
-          <a:ln cap="sq">
-            <a:noFill/>
-            <a:prstDash val="solid"/>
-            <a:miter/>
-          </a:ln>
-        </p:spPr>
-      </p:sp>
-      <p:sp>
-        <p:nvSpPr>
-          <p:cNvPr name="Freeform 3" id="3"/>
-          <p:cNvSpPr/>
-          <p:nvPr/>
-        </p:nvSpPr>
-        <p:spPr>
-          <a:xfrm flipH="true" flipV="false" rot="0">
-            <a:off x="11855903" y="-9149260"/>
-            <a:ext cx="12864194" cy="12864194"/>
-          </a:xfrm>
-          <a:custGeom>
-            <a:avLst/>
-            <a:gdLst/>
-            <a:ahLst/>
-            <a:cxnLst/>
-            <a:rect r="r" b="b" t="t" l="l"/>
-            <a:pathLst>
-              <a:path h="12864194" w="12864194">
-                <a:moveTo>
-                  <a:pt x="12864194" y="0"/>
-                </a:moveTo>
-                <a:lnTo>
-                  <a:pt x="0" y="0"/>
-                </a:lnTo>
-                <a:lnTo>
-                  <a:pt x="0" y="12864193"/>
-                </a:lnTo>
-                <a:lnTo>
-                  <a:pt x="12864194" y="12864193"/>
-                </a:lnTo>
-                <a:lnTo>
-                  <a:pt x="12864194" y="0"/>
-                </a:lnTo>
-                <a:close/>
-              </a:path>
-            </a:pathLst>
-          </a:custGeom>
-          <a:blipFill>
-            <a:blip r:embed="rId2">
-              <a:extLst>
-                <a:ext uri="{96DAC541-7B7A-43D3-8B79-37D633B846F1}">
-                  <asvg:svgBlip xmlns:asvg="http://schemas.microsoft.com/office/drawing/2016/SVG/main" r:embed="rId3"/>
-                </a:ext>
-              </a:extLst>
-            </a:blip>
-            <a:stretch>
-              <a:fillRect l="0" t="0" r="0" b="0"/>
-            </a:stretch>
-          </a:blipFill>
-          <a:ln cap="sq">
-            <a:noFill/>
-            <a:prstDash val="solid"/>
-            <a:miter/>
-          </a:ln>
-        </p:spPr>
-      </p:sp>
-      <p:sp>
-        <p:nvSpPr>
-          <p:cNvPr name="TextBox 4" id="4"/>
-          <p:cNvSpPr txBox="true"/>
-          <p:nvPr/>
-        </p:nvSpPr>
-        <p:spPr>
-          <a:xfrm rot="0">
-            <a:off x="6072066" y="2058921"/>
-            <a:ext cx="6143867" cy="1524000"/>
-          </a:xfrm>
-          <a:prstGeom prst="rect">
-            <a:avLst/>
-          </a:prstGeom>
-        </p:spPr>
-        <p:txBody>
-          <a:bodyPr anchor="t" rtlCol="false" tIns="0" lIns="0" bIns="0" rIns="0">
-            <a:spAutoFit/>
-          </a:bodyPr>
-          <a:lstStyle/>
-          <a:p>
-            <a:pPr algn="ctr" marL="0" indent="0" lvl="0">
-              <a:lnSpc>
-                <a:spcPts val="11999"/>
-              </a:lnSpc>
-              <a:spcBef>
-                <a:spcPct val="0"/>
-              </a:spcBef>
-            </a:pPr>
-            <a:r>
-              <a:rPr lang="en-US" sz="9999">
-                <a:solidFill>
-                  <a:srgbClr val="FFD93B"/>
-                </a:solidFill>
-                <a:latin typeface="Decalotype Bold"/>
-              </a:rPr>
-              <a:t>Tipografia</a:t>
-            </a:r>
-          </a:p>
-        </p:txBody>
-      </p:sp>
-      <p:grpSp>
-        <p:nvGrpSpPr>
-          <p:cNvPr name="Group 5" id="5"/>
-          <p:cNvGrpSpPr/>
-          <p:nvPr/>
-        </p:nvGrpSpPr>
-        <p:grpSpPr>
-          <a:xfrm rot="0">
-            <a:off x="5698382" y="4659425"/>
-            <a:ext cx="6891236" cy="3559129"/>
-            <a:chOff x="0" y="0"/>
-            <a:chExt cx="9188314" cy="4745505"/>
-          </a:xfrm>
-        </p:grpSpPr>
-        <p:sp>
-          <p:nvSpPr>
-            <p:cNvPr name="Freeform 6" id="6"/>
-            <p:cNvSpPr/>
-            <p:nvPr/>
-          </p:nvSpPr>
-          <p:spPr>
-            <a:xfrm flipH="false" flipV="false" rot="0">
-              <a:off x="0" y="0"/>
-              <a:ext cx="9188314" cy="3709357"/>
-            </a:xfrm>
-            <a:custGeom>
-              <a:avLst/>
-              <a:gdLst/>
-              <a:ahLst/>
-              <a:cxnLst/>
-              <a:rect r="r" b="b" t="t" l="l"/>
-              <a:pathLst>
-                <a:path h="3709357" w="9188314">
-                  <a:moveTo>
-                    <a:pt x="0" y="0"/>
-                  </a:moveTo>
-                  <a:lnTo>
-                    <a:pt x="9188314" y="0"/>
-                  </a:lnTo>
-                  <a:lnTo>
-                    <a:pt x="9188314" y="3709357"/>
-                  </a:lnTo>
-                  <a:lnTo>
-                    <a:pt x="0" y="3709357"/>
-                  </a:lnTo>
-                  <a:lnTo>
-                    <a:pt x="0" y="0"/>
-                  </a:lnTo>
-                  <a:close/>
-                </a:path>
-              </a:pathLst>
-            </a:custGeom>
-            <a:blipFill>
-              <a:blip r:embed="rId4"/>
-              <a:stretch>
-                <a:fillRect l="0" t="0" r="0" b="0"/>
-              </a:stretch>
-            </a:blipFill>
-          </p:spPr>
-        </p:sp>
-        <p:sp>
-          <p:nvSpPr>
-            <p:cNvPr name="TextBox 7" id="7"/>
-            <p:cNvSpPr txBox="true"/>
-            <p:nvPr/>
-          </p:nvSpPr>
-          <p:spPr>
-            <a:xfrm rot="0">
-              <a:off x="3236150" y="3820945"/>
-              <a:ext cx="2716014" cy="924560"/>
-            </a:xfrm>
-            <a:prstGeom prst="rect">
-              <a:avLst/>
-            </a:prstGeom>
-          </p:spPr>
-          <p:txBody>
-            <a:bodyPr anchor="t" rtlCol="false" tIns="0" lIns="0" bIns="0" rIns="0">
-              <a:spAutoFit/>
-            </a:bodyPr>
-            <a:lstStyle/>
-            <a:p>
-              <a:pPr algn="ctr">
-                <a:lnSpc>
-                  <a:spcPts val="5880"/>
-                </a:lnSpc>
-              </a:pPr>
-              <a:r>
-                <a:rPr lang="en-US" sz="4200">
-                  <a:solidFill>
-                    <a:srgbClr val="FFFFFF"/>
-                  </a:solidFill>
-                  <a:latin typeface="Open Sans"/>
-                </a:rPr>
-                <a:t>Arial MT</a:t>
-              </a:r>
-            </a:p>
-          </p:txBody>
-        </p:sp>
-      </p:grpSp>
-    </p:spTree>
-  </p:cSld>
-  <p:clrMapOvr>
-    <a:masterClrMapping/>
-  </p:clrMapOvr>
-</p:sld>
-</file>
-
 <file path=ppt/theme/theme1.xml><?xml version="1.0" encoding="utf-8"?>
 <a:theme xmlns:a="http://schemas.openxmlformats.org/drawingml/2006/main" name="Office Theme">
   <a:themeElements>

</xml_diff>